<commit_message>
Replaced arch diagram and updated bullets per peer review
</commit_message>
<xml_diff>
--- a/docs/deployment_guide/images/icp-security-architecture-diagram.pptx
+++ b/docs/deployment_guide/images/icp-security-architecture-diagram.pptx
@@ -209,7 +209,7 @@
           <a:p>
             <a:fld id="{38CD52B8-0434-4221-8B5A-A46768E0484A}" type="datetimeFigureOut">
               <a:rPr lang="en-US" smtClean="0"/>
-              <a:t>6/27/2022</a:t>
+              <a:t>6/29/2022</a:t>
             </a:fld>
             <a:endParaRPr lang="en-US"/>
           </a:p>
@@ -696,7 +696,7 @@
           <a:p>
             <a:fld id="{0EF7D7AE-BD01-45EA-A99D-906BA1D2F298}" type="datetimeFigureOut">
               <a:rPr lang="en-US" smtClean="0"/>
-              <a:t>6/27/2022</a:t>
+              <a:t>6/29/2022</a:t>
             </a:fld>
             <a:endParaRPr lang="en-US"/>
           </a:p>
@@ -866,7 +866,7 @@
           <a:p>
             <a:fld id="{0EF7D7AE-BD01-45EA-A99D-906BA1D2F298}" type="datetimeFigureOut">
               <a:rPr lang="en-US" smtClean="0"/>
-              <a:t>6/27/2022</a:t>
+              <a:t>6/29/2022</a:t>
             </a:fld>
             <a:endParaRPr lang="en-US"/>
           </a:p>
@@ -1046,7 +1046,7 @@
           <a:p>
             <a:fld id="{0EF7D7AE-BD01-45EA-A99D-906BA1D2F298}" type="datetimeFigureOut">
               <a:rPr lang="en-US" smtClean="0"/>
-              <a:t>6/27/2022</a:t>
+              <a:t>6/29/2022</a:t>
             </a:fld>
             <a:endParaRPr lang="en-US"/>
           </a:p>
@@ -1216,7 +1216,7 @@
           <a:p>
             <a:fld id="{0EF7D7AE-BD01-45EA-A99D-906BA1D2F298}" type="datetimeFigureOut">
               <a:rPr lang="en-US" smtClean="0"/>
-              <a:t>6/27/2022</a:t>
+              <a:t>6/29/2022</a:t>
             </a:fld>
             <a:endParaRPr lang="en-US"/>
           </a:p>
@@ -1462,7 +1462,7 @@
           <a:p>
             <a:fld id="{0EF7D7AE-BD01-45EA-A99D-906BA1D2F298}" type="datetimeFigureOut">
               <a:rPr lang="en-US" smtClean="0"/>
-              <a:t>6/27/2022</a:t>
+              <a:t>6/29/2022</a:t>
             </a:fld>
             <a:endParaRPr lang="en-US"/>
           </a:p>
@@ -1694,7 +1694,7 @@
           <a:p>
             <a:fld id="{0EF7D7AE-BD01-45EA-A99D-906BA1D2F298}" type="datetimeFigureOut">
               <a:rPr lang="en-US" smtClean="0"/>
-              <a:t>6/27/2022</a:t>
+              <a:t>6/29/2022</a:t>
             </a:fld>
             <a:endParaRPr lang="en-US"/>
           </a:p>
@@ -2061,7 +2061,7 @@
           <a:p>
             <a:fld id="{0EF7D7AE-BD01-45EA-A99D-906BA1D2F298}" type="datetimeFigureOut">
               <a:rPr lang="en-US" smtClean="0"/>
-              <a:t>6/27/2022</a:t>
+              <a:t>6/29/2022</a:t>
             </a:fld>
             <a:endParaRPr lang="en-US"/>
           </a:p>
@@ -2179,7 +2179,7 @@
           <a:p>
             <a:fld id="{0EF7D7AE-BD01-45EA-A99D-906BA1D2F298}" type="datetimeFigureOut">
               <a:rPr lang="en-US" smtClean="0"/>
-              <a:t>6/27/2022</a:t>
+              <a:t>6/29/2022</a:t>
             </a:fld>
             <a:endParaRPr lang="en-US"/>
           </a:p>
@@ -2274,7 +2274,7 @@
           <a:p>
             <a:fld id="{0EF7D7AE-BD01-45EA-A99D-906BA1D2F298}" type="datetimeFigureOut">
               <a:rPr lang="en-US" smtClean="0"/>
-              <a:t>6/27/2022</a:t>
+              <a:t>6/29/2022</a:t>
             </a:fld>
             <a:endParaRPr lang="en-US"/>
           </a:p>
@@ -2551,7 +2551,7 @@
           <a:p>
             <a:fld id="{0EF7D7AE-BD01-45EA-A99D-906BA1D2F298}" type="datetimeFigureOut">
               <a:rPr lang="en-US" smtClean="0"/>
-              <a:t>6/27/2022</a:t>
+              <a:t>6/29/2022</a:t>
             </a:fld>
             <a:endParaRPr lang="en-US"/>
           </a:p>
@@ -2808,7 +2808,7 @@
           <a:p>
             <a:fld id="{0EF7D7AE-BD01-45EA-A99D-906BA1D2F298}" type="datetimeFigureOut">
               <a:rPr lang="en-US" smtClean="0"/>
-              <a:t>6/27/2022</a:t>
+              <a:t>6/29/2022</a:t>
             </a:fld>
             <a:endParaRPr lang="en-US"/>
           </a:p>
@@ -3021,7 +3021,7 @@
           <a:p>
             <a:fld id="{0EF7D7AE-BD01-45EA-A99D-906BA1D2F298}" type="datetimeFigureOut">
               <a:rPr lang="en-US" smtClean="0"/>
-              <a:t>6/27/2022</a:t>
+              <a:t>6/29/2022</a:t>
             </a:fld>
             <a:endParaRPr lang="en-US"/>
           </a:p>
@@ -4917,45 +4917,6 @@
           </a:prstGeom>
         </p:spPr>
       </p:pic>
-      <p:sp>
-        <p:nvSpPr>
-          <p:cNvPr id="136" name="TextBox 135">
-            <a:extLst>
-              <a:ext uri="{FF2B5EF4-FFF2-40B4-BE49-F238E27FC236}">
-                <a16:creationId xmlns:a16="http://schemas.microsoft.com/office/drawing/2014/main" id="{1824E4D1-26C3-4347-A00E-0EE6CC806219}"/>
-              </a:ext>
-            </a:extLst>
-          </p:cNvPr>
-          <p:cNvSpPr txBox="1"/>
-          <p:nvPr/>
-        </p:nvSpPr>
-        <p:spPr>
-          <a:xfrm>
-            <a:off x="506652" y="4662483"/>
-            <a:ext cx="2301904" cy="276999"/>
-          </a:xfrm>
-          <a:prstGeom prst="rect">
-            <a:avLst/>
-          </a:prstGeom>
-          <a:noFill/>
-        </p:spPr>
-        <p:txBody>
-          <a:bodyPr wrap="square" rtlCol="0">
-            <a:spAutoFit/>
-          </a:bodyPr>
-          <a:lstStyle/>
-          <a:p>
-            <a:pPr algn="ctr"/>
-            <a:r>
-              <a:rPr lang="en-US" sz="1200" dirty="0">
-                <a:latin typeface="Arial" panose="020B0604020202020204" pitchFamily="34" charset="0"/>
-                <a:cs typeface="Arial" panose="020B0604020202020204" pitchFamily="34" charset="0"/>
-              </a:rPr>
-              <a:t>ELB</a:t>
-            </a:r>
-          </a:p>
-        </p:txBody>
-      </p:sp>
       <p:pic>
         <p:nvPicPr>
           <p:cNvPr id="140" name="Graphic 71">
@@ -5067,79 +5028,6 @@
           </a:prstGeom>
         </p:spPr>
       </p:pic>
-      <p:sp>
-        <p:nvSpPr>
-          <p:cNvPr id="62" name="Rectangle 61">
-            <a:extLst>
-              <a:ext uri="{FF2B5EF4-FFF2-40B4-BE49-F238E27FC236}">
-                <a16:creationId xmlns:a16="http://schemas.microsoft.com/office/drawing/2014/main" id="{7B1A2878-C5FE-3641-84A1-AF1A9456DE01}"/>
-              </a:ext>
-            </a:extLst>
-          </p:cNvPr>
-          <p:cNvSpPr/>
-          <p:nvPr/>
-        </p:nvSpPr>
-        <p:spPr>
-          <a:xfrm>
-            <a:off x="2763463" y="4083549"/>
-            <a:ext cx="8291481" cy="1226331"/>
-          </a:xfrm>
-          <a:prstGeom prst="rect">
-            <a:avLst/>
-          </a:prstGeom>
-          <a:noFill/>
-          <a:ln w="12700">
-            <a:solidFill>
-              <a:srgbClr val="5A6B86"/>
-            </a:solidFill>
-            <a:prstDash val="dash"/>
-          </a:ln>
-        </p:spPr>
-        <p:style>
-          <a:lnRef idx="2">
-            <a:schemeClr val="accent1">
-              <a:shade val="50000"/>
-            </a:schemeClr>
-          </a:lnRef>
-          <a:fillRef idx="1">
-            <a:schemeClr val="accent1"/>
-          </a:fillRef>
-          <a:effectRef idx="0">
-            <a:schemeClr val="accent1"/>
-          </a:effectRef>
-          <a:fontRef idx="minor">
-            <a:schemeClr val="lt1"/>
-          </a:fontRef>
-        </p:style>
-        <p:txBody>
-          <a:bodyPr rot="0" spcFirstLastPara="0" vertOverflow="overflow" horzOverflow="overflow" vert="horz" wrap="square" lIns="91440" tIns="91440" rIns="91440" bIns="45720" numCol="1" spcCol="0" rtlCol="0" fromWordArt="0" anchor="t" anchorCtr="0" forceAA="0" compatLnSpc="1">
-            <a:prstTxWarp prst="textNoShape">
-              <a:avLst/>
-            </a:prstTxWarp>
-            <a:noAutofit/>
-          </a:bodyPr>
-          <a:lstStyle/>
-          <a:p>
-            <a:pPr algn="ctr"/>
-            <a:r>
-              <a:rPr lang="en-US" sz="1200" dirty="0" err="1">
-                <a:solidFill>
-                  <a:srgbClr val="5A6B86"/>
-                </a:solidFill>
-              </a:rPr>
-              <a:t>OpenShift</a:t>
-            </a:r>
-            <a:r>
-              <a:rPr lang="en-US" sz="1200" dirty="0">
-                <a:solidFill>
-                  <a:srgbClr val="5A6B86"/>
-                </a:solidFill>
-              </a:rPr>
-              <a:t> auto scaling</a:t>
-            </a:r>
-          </a:p>
-        </p:txBody>
-      </p:sp>
       <p:pic>
         <p:nvPicPr>
           <p:cNvPr id="63" name="Graphic 24">
@@ -5168,7 +5056,7 @@
         </p:blipFill>
         <p:spPr>
           <a:xfrm>
-            <a:off x="1303254" y="2637718"/>
+            <a:off x="1303254" y="4071885"/>
             <a:ext cx="711200" cy="711200"/>
           </a:xfrm>
           <a:prstGeom prst="rect">
@@ -5190,7 +5078,7 @@
         </p:nvSpPr>
         <p:spPr>
           <a:xfrm>
-            <a:off x="492914" y="3406953"/>
+            <a:off x="461559" y="4792339"/>
             <a:ext cx="2301904" cy="276999"/>
           </a:xfrm>
           <a:prstGeom prst="rect">
@@ -5211,117 +5099,6 @@
                 <a:cs typeface="Arial" panose="020B0604020202020204" pitchFamily="34" charset="0"/>
               </a:rPr>
               <a:t>Amazon EBS</a:t>
-            </a:r>
-          </a:p>
-        </p:txBody>
-      </p:sp>
-      <p:pic>
-        <p:nvPicPr>
-          <p:cNvPr id="65" name="Graphic 33">
-            <a:extLst>
-              <a:ext uri="{FF2B5EF4-FFF2-40B4-BE49-F238E27FC236}">
-                <a16:creationId xmlns:a16="http://schemas.microsoft.com/office/drawing/2014/main" id="{BCCFBA15-0ADB-FE42-90D4-D0566D2E184F}"/>
-              </a:ext>
-            </a:extLst>
-          </p:cNvPr>
-          <p:cNvPicPr>
-            <a:picLocks noChangeAspect="1"/>
-          </p:cNvPicPr>
-          <p:nvPr/>
-        </p:nvPicPr>
-        <p:blipFill>
-          <a:blip r:embed="rId17">
-            <a:extLst>
-              <a:ext uri="{96DAC541-7B7A-43D3-8B79-37D633B846F1}">
-                <asvg:svgBlip xmlns:asvg="http://schemas.microsoft.com/office/drawing/2016/SVG/main" r:embed="rId18"/>
-              </a:ext>
-            </a:extLst>
-          </a:blip>
-          <a:stretch>
-            <a:fillRect/>
-          </a:stretch>
-        </p:blipFill>
-        <p:spPr>
-          <a:xfrm>
-            <a:off x="1302004" y="3887827"/>
-            <a:ext cx="711200" cy="711200"/>
-          </a:xfrm>
-          <a:prstGeom prst="rect">
-            <a:avLst/>
-          </a:prstGeom>
-        </p:spPr>
-      </p:pic>
-      <p:pic>
-        <p:nvPicPr>
-          <p:cNvPr id="66" name="Graphic 6">
-            <a:extLst>
-              <a:ext uri="{FF2B5EF4-FFF2-40B4-BE49-F238E27FC236}">
-                <a16:creationId xmlns:a16="http://schemas.microsoft.com/office/drawing/2014/main" id="{D8AF6CFD-7182-AE41-BE56-CA8D81C11633}"/>
-              </a:ext>
-            </a:extLst>
-          </p:cNvPr>
-          <p:cNvPicPr>
-            <a:picLocks noChangeAspect="1"/>
-          </p:cNvPicPr>
-          <p:nvPr/>
-        </p:nvPicPr>
-        <p:blipFill>
-          <a:blip r:embed="rId19">
-            <a:extLst>
-              <a:ext uri="{96DAC541-7B7A-43D3-8B79-37D633B846F1}">
-                <asvg:svgBlip xmlns:asvg="http://schemas.microsoft.com/office/drawing/2016/SVG/main" r:embed="rId20"/>
-              </a:ext>
-            </a:extLst>
-          </a:blip>
-          <a:stretch>
-            <a:fillRect/>
-          </a:stretch>
-        </p:blipFill>
-        <p:spPr>
-          <a:xfrm>
-            <a:off x="1302004" y="1492523"/>
-            <a:ext cx="711200" cy="711200"/>
-          </a:xfrm>
-          <a:prstGeom prst="rect">
-            <a:avLst/>
-          </a:prstGeom>
-        </p:spPr>
-      </p:pic>
-      <p:sp>
-        <p:nvSpPr>
-          <p:cNvPr id="67" name="TextBox 66">
-            <a:extLst>
-              <a:ext uri="{FF2B5EF4-FFF2-40B4-BE49-F238E27FC236}">
-                <a16:creationId xmlns:a16="http://schemas.microsoft.com/office/drawing/2014/main" id="{9ABBCCC2-6A9F-CE45-9C04-D783E79573D6}"/>
-              </a:ext>
-            </a:extLst>
-          </p:cNvPr>
-          <p:cNvSpPr txBox="1"/>
-          <p:nvPr/>
-        </p:nvSpPr>
-        <p:spPr>
-          <a:xfrm>
-            <a:off x="484679" y="2238563"/>
-            <a:ext cx="2301904" cy="276999"/>
-          </a:xfrm>
-          <a:prstGeom prst="rect">
-            <a:avLst/>
-          </a:prstGeom>
-          <a:noFill/>
-        </p:spPr>
-        <p:txBody>
-          <a:bodyPr wrap="square" rtlCol="0">
-            <a:spAutoFit/>
-          </a:bodyPr>
-          <a:lstStyle/>
-          <a:p>
-            <a:pPr algn="ctr"/>
-            <a:r>
-              <a:rPr lang="en-US" sz="1200" dirty="0">
-                <a:latin typeface="Arial" panose="020B0604020202020204" pitchFamily="34" charset="0"/>
-                <a:cs typeface="Arial" panose="020B0604020202020204" pitchFamily="34" charset="0"/>
-              </a:rPr>
-              <a:t>Amazon EC2</a:t>
             </a:r>
           </a:p>
         </p:txBody>
@@ -5341,7 +5118,7 @@
           <p:nvPr/>
         </p:nvPicPr>
         <p:blipFill>
-          <a:blip r:embed="rId21" cstate="print">
+          <a:blip r:embed="rId17" cstate="print">
             <a:extLst>
               <a:ext uri="{28A0092B-C50C-407E-A947-70E740481C1C}">
                 <a14:useLocalDpi xmlns:a14="http://schemas.microsoft.com/office/drawing/2010/main" val="0"/>
@@ -5618,10 +5395,10 @@
           <p:nvPr/>
         </p:nvPicPr>
         <p:blipFill>
-          <a:blip r:embed="rId22">
+          <a:blip r:embed="rId18">
             <a:extLst>
               <a:ext uri="{96DAC541-7B7A-43D3-8B79-37D633B846F1}">
-                <asvg:svgBlip xmlns:asvg="http://schemas.microsoft.com/office/drawing/2016/SVG/main" r:embed="rId23"/>
+                <asvg:svgBlip xmlns:asvg="http://schemas.microsoft.com/office/drawing/2016/SVG/main" r:embed="rId19"/>
               </a:ext>
             </a:extLst>
           </a:blip>
@@ -5654,10 +5431,10 @@
           <p:nvPr/>
         </p:nvPicPr>
         <p:blipFill>
-          <a:blip r:embed="rId22">
+          <a:blip r:embed="rId18">
             <a:extLst>
               <a:ext uri="{96DAC541-7B7A-43D3-8B79-37D633B846F1}">
-                <asvg:svgBlip xmlns:asvg="http://schemas.microsoft.com/office/drawing/2016/SVG/main" r:embed="rId23"/>
+                <asvg:svgBlip xmlns:asvg="http://schemas.microsoft.com/office/drawing/2016/SVG/main" r:embed="rId19"/>
               </a:ext>
             </a:extLst>
           </a:blip>
@@ -5690,10 +5467,10 @@
           <p:nvPr/>
         </p:nvPicPr>
         <p:blipFill>
-          <a:blip r:embed="rId22">
+          <a:blip r:embed="rId18">
             <a:extLst>
               <a:ext uri="{96DAC541-7B7A-43D3-8B79-37D633B846F1}">
-                <asvg:svgBlip xmlns:asvg="http://schemas.microsoft.com/office/drawing/2016/SVG/main" r:embed="rId23"/>
+                <asvg:svgBlip xmlns:asvg="http://schemas.microsoft.com/office/drawing/2016/SVG/main" r:embed="rId19"/>
               </a:ext>
             </a:extLst>
           </a:blip>
@@ -5726,10 +5503,10 @@
           <p:nvPr/>
         </p:nvPicPr>
         <p:blipFill>
-          <a:blip r:embed="rId24">
+          <a:blip r:embed="rId20">
             <a:extLst>
               <a:ext uri="{96DAC541-7B7A-43D3-8B79-37D633B846F1}">
-                <asvg:svgBlip xmlns:asvg="http://schemas.microsoft.com/office/drawing/2016/SVG/main" r:embed="rId25"/>
+                <asvg:svgBlip xmlns:asvg="http://schemas.microsoft.com/office/drawing/2016/SVG/main" r:embed="rId21"/>
               </a:ext>
             </a:extLst>
           </a:blip>
@@ -5972,10 +5749,10 @@
           <p:nvPr/>
         </p:nvPicPr>
         <p:blipFill>
-          <a:blip r:embed="rId24">
+          <a:blip r:embed="rId20">
             <a:extLst>
               <a:ext uri="{96DAC541-7B7A-43D3-8B79-37D633B846F1}">
-                <asvg:svgBlip xmlns:asvg="http://schemas.microsoft.com/office/drawing/2016/SVG/main" r:embed="rId25"/>
+                <asvg:svgBlip xmlns:asvg="http://schemas.microsoft.com/office/drawing/2016/SVG/main" r:embed="rId21"/>
               </a:ext>
             </a:extLst>
           </a:blip>
@@ -6008,10 +5785,10 @@
           <p:nvPr/>
         </p:nvPicPr>
         <p:blipFill>
-          <a:blip r:embed="rId24">
+          <a:blip r:embed="rId20">
             <a:extLst>
               <a:ext uri="{96DAC541-7B7A-43D3-8B79-37D633B846F1}">
-                <asvg:svgBlip xmlns:asvg="http://schemas.microsoft.com/office/drawing/2016/SVG/main" r:embed="rId25"/>
+                <asvg:svgBlip xmlns:asvg="http://schemas.microsoft.com/office/drawing/2016/SVG/main" r:embed="rId21"/>
               </a:ext>
             </a:extLst>
           </a:blip>
@@ -6113,10 +5890,10 @@
           <p:nvPr/>
         </p:nvPicPr>
         <p:blipFill>
-          <a:blip r:embed="rId26">
+          <a:blip r:embed="rId22">
             <a:extLst>
               <a:ext uri="{96DAC541-7B7A-43D3-8B79-37D633B846F1}">
-                <asvg:svgBlip xmlns:asvg="http://schemas.microsoft.com/office/drawing/2016/SVG/main" r:embed="rId27"/>
+                <asvg:svgBlip xmlns:asvg="http://schemas.microsoft.com/office/drawing/2016/SVG/main" r:embed="rId23"/>
               </a:ext>
             </a:extLst>
           </a:blip>
@@ -6148,10 +5925,10 @@
           <p:nvPr/>
         </p:nvPicPr>
         <p:blipFill>
-          <a:blip r:embed="rId28">
+          <a:blip r:embed="rId24">
             <a:extLst>
               <a:ext uri="{96DAC541-7B7A-43D3-8B79-37D633B846F1}">
-                <asvg:svgBlip xmlns:asvg="http://schemas.microsoft.com/office/drawing/2016/SVG/main" r:embed="rId29"/>
+                <asvg:svgBlip xmlns:asvg="http://schemas.microsoft.com/office/drawing/2016/SVG/main" r:embed="rId25"/>
               </a:ext>
             </a:extLst>
           </a:blip>
@@ -6390,6 +6167,76 @@
           </a:fontRef>
         </p:style>
       </p:cxnSp>
+      <p:sp>
+        <p:nvSpPr>
+          <p:cNvPr id="130" name="Rectangle 129">
+            <a:extLst>
+              <a:ext uri="{FF2B5EF4-FFF2-40B4-BE49-F238E27FC236}">
+                <a16:creationId xmlns:a16="http://schemas.microsoft.com/office/drawing/2014/main" id="{3F634940-7D4A-4224-A5CB-F88AD10E871F}"/>
+              </a:ext>
+            </a:extLst>
+          </p:cNvPr>
+          <p:cNvSpPr/>
+          <p:nvPr/>
+        </p:nvSpPr>
+        <p:spPr>
+          <a:xfrm>
+            <a:off x="2786583" y="4018340"/>
+            <a:ext cx="8115290" cy="1253559"/>
+          </a:xfrm>
+          <a:prstGeom prst="rect">
+            <a:avLst/>
+          </a:prstGeom>
+          <a:noFill/>
+          <a:ln w="12700">
+            <a:solidFill>
+              <a:srgbClr val="5A6B86"/>
+            </a:solidFill>
+            <a:prstDash val="dash"/>
+          </a:ln>
+        </p:spPr>
+        <p:style>
+          <a:lnRef idx="2">
+            <a:schemeClr val="accent1">
+              <a:shade val="50000"/>
+            </a:schemeClr>
+          </a:lnRef>
+          <a:fillRef idx="1">
+            <a:schemeClr val="accent1"/>
+          </a:fillRef>
+          <a:effectRef idx="0">
+            <a:schemeClr val="accent1"/>
+          </a:effectRef>
+          <a:fontRef idx="minor">
+            <a:schemeClr val="lt1"/>
+          </a:fontRef>
+        </p:style>
+        <p:txBody>
+          <a:bodyPr tIns="91440"/>
+          <a:lstStyle/>
+          <a:p>
+            <a:pPr algn="ctr" eaLnBrk="1" fontAlgn="auto" hangingPunct="1">
+              <a:spcBef>
+                <a:spcPts val="0"/>
+              </a:spcBef>
+              <a:spcAft>
+                <a:spcPts val="0"/>
+              </a:spcAft>
+              <a:defRPr/>
+            </a:pPr>
+            <a:r>
+              <a:rPr lang="en-US" sz="1200" dirty="0">
+                <a:solidFill>
+                  <a:srgbClr val="5A6B86"/>
+                </a:solidFill>
+                <a:latin typeface="Arial" panose="020B0604020202020204" pitchFamily="34" charset="0"/>
+                <a:cs typeface="Arial" panose="020B0604020202020204" pitchFamily="34" charset="0"/>
+              </a:rPr>
+              <a:t>OpenShift autoscaling</a:t>
+            </a:r>
+          </a:p>
+        </p:txBody>
+      </p:sp>
     </p:spTree>
     <p:extLst>
       <p:ext uri="{BB962C8B-B14F-4D97-AF65-F5344CB8AC3E}">

</xml_diff>